<commit_message>
tdf#100065 Fix scale of transformation
The shape needs to be flipped to compensate the change of
mbFlipH/mbFlipV.

Change-Id: I7b680497fee6ae9ed7bbd6f4ed9089d1a25a1deb
Reviewed-on: https://gerrit.libreoffice.org/42766
Reviewed-by: Tamás Zolnai <tamas.zolnai@collabora.com>
Tested-by: Tamás Zolnai <tamas.zolnai@collabora.com>
</commit_message>
<xml_diff>
--- a/sd/qa/unit/data/pptx/tdf100065.pptx
+++ b/sd/qa/unit/data/pptx/tdf100065.pptx
@@ -104,7 +104,16 @@
       </a:defRPr>
     </a:lvl9pPr>
   </p:defaultTextStyle>
+  <p:extLst>
+    <p:ext uri="{EFAFB233-063F-42B5-8137-9DF3F51BA10A}">
+      <p15:sldGuideLst xmlns:p15="http://schemas.microsoft.com/office/powerpoint/2012/main"/>
+    </p:ext>
+  </p:extLst>
 </p:presentation>
+</file>
+
+<file path=ppt/revisionInfo.xml><?xml version="1.0" encoding="utf-8"?>
+<p1510:revInfo xmlns:a="http://schemas.openxmlformats.org/drawingml/2006/main" xmlns:r="http://schemas.openxmlformats.org/officeDocument/2006/relationships" xmlns:p1510="http://schemas.microsoft.com/office/powerpoint/2015/10/main"/>
 </file>
 
 <file path=ppt/slideLayouts/slideLayout1.xml><?xml version="1.0" encoding="utf-8"?>
@@ -254,7 +263,7 @@
           <a:p>
             <a:fld id="{274A0D3E-E734-4B2A-B231-E14E5294DB4B}" type="datetimeFigureOut">
               <a:rPr lang="de-DE" smtClean="0"/>
-              <a:t>02.09.2017</a:t>
+              <a:t>25.09.2017</a:t>
             </a:fld>
             <a:endParaRPr lang="de-DE"/>
           </a:p>
@@ -452,7 +461,7 @@
           <a:p>
             <a:fld id="{274A0D3E-E734-4B2A-B231-E14E5294DB4B}" type="datetimeFigureOut">
               <a:rPr lang="de-DE" smtClean="0"/>
-              <a:t>02.09.2017</a:t>
+              <a:t>25.09.2017</a:t>
             </a:fld>
             <a:endParaRPr lang="de-DE"/>
           </a:p>
@@ -660,7 +669,7 @@
           <a:p>
             <a:fld id="{274A0D3E-E734-4B2A-B231-E14E5294DB4B}" type="datetimeFigureOut">
               <a:rPr lang="de-DE" smtClean="0"/>
-              <a:t>02.09.2017</a:t>
+              <a:t>25.09.2017</a:t>
             </a:fld>
             <a:endParaRPr lang="de-DE"/>
           </a:p>
@@ -858,7 +867,7 @@
           <a:p>
             <a:fld id="{274A0D3E-E734-4B2A-B231-E14E5294DB4B}" type="datetimeFigureOut">
               <a:rPr lang="de-DE" smtClean="0"/>
-              <a:t>02.09.2017</a:t>
+              <a:t>25.09.2017</a:t>
             </a:fld>
             <a:endParaRPr lang="de-DE"/>
           </a:p>
@@ -1133,7 +1142,7 @@
           <a:p>
             <a:fld id="{274A0D3E-E734-4B2A-B231-E14E5294DB4B}" type="datetimeFigureOut">
               <a:rPr lang="de-DE" smtClean="0"/>
-              <a:t>02.09.2017</a:t>
+              <a:t>25.09.2017</a:t>
             </a:fld>
             <a:endParaRPr lang="de-DE"/>
           </a:p>
@@ -1398,7 +1407,7 @@
           <a:p>
             <a:fld id="{274A0D3E-E734-4B2A-B231-E14E5294DB4B}" type="datetimeFigureOut">
               <a:rPr lang="de-DE" smtClean="0"/>
-              <a:t>02.09.2017</a:t>
+              <a:t>25.09.2017</a:t>
             </a:fld>
             <a:endParaRPr lang="de-DE"/>
           </a:p>
@@ -1810,7 +1819,7 @@
           <a:p>
             <a:fld id="{274A0D3E-E734-4B2A-B231-E14E5294DB4B}" type="datetimeFigureOut">
               <a:rPr lang="de-DE" smtClean="0"/>
-              <a:t>02.09.2017</a:t>
+              <a:t>25.09.2017</a:t>
             </a:fld>
             <a:endParaRPr lang="de-DE"/>
           </a:p>
@@ -1951,7 +1960,7 @@
           <a:p>
             <a:fld id="{274A0D3E-E734-4B2A-B231-E14E5294DB4B}" type="datetimeFigureOut">
               <a:rPr lang="de-DE" smtClean="0"/>
-              <a:t>02.09.2017</a:t>
+              <a:t>25.09.2017</a:t>
             </a:fld>
             <a:endParaRPr lang="de-DE"/>
           </a:p>
@@ -2064,7 +2073,7 @@
           <a:p>
             <a:fld id="{274A0D3E-E734-4B2A-B231-E14E5294DB4B}" type="datetimeFigureOut">
               <a:rPr lang="de-DE" smtClean="0"/>
-              <a:t>02.09.2017</a:t>
+              <a:t>25.09.2017</a:t>
             </a:fld>
             <a:endParaRPr lang="de-DE"/>
           </a:p>
@@ -2375,7 +2384,7 @@
           <a:p>
             <a:fld id="{274A0D3E-E734-4B2A-B231-E14E5294DB4B}" type="datetimeFigureOut">
               <a:rPr lang="de-DE" smtClean="0"/>
-              <a:t>02.09.2017</a:t>
+              <a:t>25.09.2017</a:t>
             </a:fld>
             <a:endParaRPr lang="de-DE"/>
           </a:p>
@@ -2663,7 +2672,7 @@
           <a:p>
             <a:fld id="{274A0D3E-E734-4B2A-B231-E14E5294DB4B}" type="datetimeFigureOut">
               <a:rPr lang="de-DE" smtClean="0"/>
-              <a:t>02.09.2017</a:t>
+              <a:t>25.09.2017</a:t>
             </a:fld>
             <a:endParaRPr lang="de-DE"/>
           </a:p>
@@ -2904,7 +2913,7 @@
           <a:p>
             <a:fld id="{274A0D3E-E734-4B2A-B231-E14E5294DB4B}" type="datetimeFigureOut">
               <a:rPr lang="de-DE" smtClean="0"/>
-              <a:t>02.09.2017</a:t>
+              <a:t>25.09.2017</a:t>
             </a:fld>
             <a:endParaRPr lang="de-DE"/>
           </a:p>
@@ -3335,7 +3344,7 @@
         </p:nvGrpSpPr>
         <p:grpSpPr>
           <a:xfrm rot="1200000">
-            <a:off x="4296000" y="690464"/>
+            <a:off x="898458" y="1638419"/>
             <a:ext cx="3600000" cy="2450868"/>
             <a:chOff x="4296000" y="690464"/>
             <a:chExt cx="3600000" cy="2450868"/>
@@ -3432,6 +3441,119 @@
                 <a:t>test</a:t>
               </a:r>
               <a:endParaRPr lang="de-DE" dirty="0"/>
+            </a:p>
+          </p:txBody>
+        </p:sp>
+      </p:grpSp>
+      <p:grpSp>
+        <p:nvGrpSpPr>
+          <p:cNvPr id="4" name="Gruppieren 3">
+            <a:extLst>
+              <a:ext uri="{FF2B5EF4-FFF2-40B4-BE49-F238E27FC236}">
+                <a16:creationId xmlns:a16="http://schemas.microsoft.com/office/drawing/2014/main" id="{E173F68B-5882-4C67-9B89-031108A62F68}"/>
+              </a:ext>
+            </a:extLst>
+          </p:cNvPr>
+          <p:cNvGrpSpPr/>
+          <p:nvPr/>
+        </p:nvGrpSpPr>
+        <p:grpSpPr>
+          <a:xfrm flipV="1">
+            <a:off x="7239698" y="1879134"/>
+            <a:ext cx="2265029" cy="3179427"/>
+            <a:chOff x="7239698" y="1879134"/>
+            <a:chExt cx="2265029" cy="3179427"/>
+          </a:xfrm>
+        </p:grpSpPr>
+        <p:sp>
+          <p:nvSpPr>
+            <p:cNvPr id="2" name="Gewitterblitz 1">
+              <a:extLst>
+                <a:ext uri="{FF2B5EF4-FFF2-40B4-BE49-F238E27FC236}">
+                  <a16:creationId xmlns:a16="http://schemas.microsoft.com/office/drawing/2014/main" id="{67C6F979-0C12-476C-A33C-18E8CCF65047}"/>
+                </a:ext>
+              </a:extLst>
+            </p:cNvPr>
+            <p:cNvSpPr/>
+            <p:nvPr/>
+          </p:nvSpPr>
+          <p:spPr>
+            <a:xfrm rot="10800000">
+              <a:off x="7239699" y="2986481"/>
+              <a:ext cx="2265028" cy="2072080"/>
+            </a:xfrm>
+            <a:prstGeom prst="lightningBolt">
+              <a:avLst/>
+            </a:prstGeom>
+          </p:spPr>
+          <p:style>
+            <a:lnRef idx="2">
+              <a:schemeClr val="accent1">
+                <a:shade val="50000"/>
+              </a:schemeClr>
+            </a:lnRef>
+            <a:fillRef idx="1">
+              <a:schemeClr val="accent1"/>
+            </a:fillRef>
+            <a:effectRef idx="0">
+              <a:schemeClr val="accent1"/>
+            </a:effectRef>
+            <a:fontRef idx="minor">
+              <a:schemeClr val="lt1"/>
+            </a:fontRef>
+          </p:style>
+          <p:txBody>
+            <a:bodyPr rtlCol="0" anchor="ctr"/>
+            <a:lstStyle/>
+            <a:p>
+              <a:pPr algn="ctr"/>
+              <a:endParaRPr lang="de-DE"/>
+            </a:p>
+          </p:txBody>
+        </p:sp>
+        <p:sp>
+          <p:nvSpPr>
+            <p:cNvPr id="3" name="Rechteck 2">
+              <a:extLst>
+                <a:ext uri="{FF2B5EF4-FFF2-40B4-BE49-F238E27FC236}">
+                  <a16:creationId xmlns:a16="http://schemas.microsoft.com/office/drawing/2014/main" id="{015D8A20-A6BF-479A-833F-1FC183D0C931}"/>
+                </a:ext>
+              </a:extLst>
+            </p:cNvPr>
+            <p:cNvSpPr/>
+            <p:nvPr/>
+          </p:nvSpPr>
+          <p:spPr>
+            <a:xfrm>
+              <a:off x="7239698" y="1879134"/>
+              <a:ext cx="2265029" cy="956345"/>
+            </a:xfrm>
+            <a:prstGeom prst="rect">
+              <a:avLst/>
+            </a:prstGeom>
+          </p:spPr>
+          <p:style>
+            <a:lnRef idx="2">
+              <a:schemeClr val="accent1">
+                <a:shade val="50000"/>
+              </a:schemeClr>
+            </a:lnRef>
+            <a:fillRef idx="1">
+              <a:schemeClr val="accent1"/>
+            </a:fillRef>
+            <a:effectRef idx="0">
+              <a:schemeClr val="accent1"/>
+            </a:effectRef>
+            <a:fontRef idx="minor">
+              <a:schemeClr val="lt1"/>
+            </a:fontRef>
+          </p:style>
+          <p:txBody>
+            <a:bodyPr rtlCol="0" anchor="ctr"/>
+            <a:lstStyle/>
+            <a:p>
+              <a:pPr algn="ctr"/>
+              <a:endParaRPr lang="de-DE"/>
             </a:p>
           </p:txBody>
         </p:sp>

</xml_diff>